<commit_message>
inserção de referências e pequenas correções no texto
</commit_message>
<xml_diff>
--- a/game-testing.pptx
+++ b/game-testing.pptx
@@ -5,7 +5,7 @@
     <p:sldMasterId id="2147483648" r:id="rId1"/>
   </p:sldMasterIdLst>
   <p:notesMasterIdLst>
-    <p:notesMasterId r:id="rId63"/>
+    <p:notesMasterId r:id="rId64"/>
   </p:notesMasterIdLst>
   <p:sldIdLst>
     <p:sldId id="256" r:id="rId2"/>
@@ -69,6 +69,7 @@
     <p:sldId id="371" r:id="rId60"/>
     <p:sldId id="372" r:id="rId61"/>
     <p:sldId id="373" r:id="rId62"/>
+    <p:sldId id="392" r:id="rId63"/>
   </p:sldIdLst>
   <p:sldSz cx="12192000" cy="6858000"/>
   <p:notesSz cx="6858000" cy="9144000"/>
@@ -257,7 +258,7 @@
           <a:p>
             <a:fld id="{94D3EB41-CF60-4C9F-BD83-AE56FA0945EB}" type="datetimeFigureOut">
               <a:rPr lang="pt-BR" smtClean="0"/>
-              <a:t>17/10/2018</a:t>
+              <a:t>12/11/2019</a:t>
             </a:fld>
             <a:endParaRPr lang="pt-BR"/>
           </a:p>
@@ -5908,6 +5909,90 @@
 </p:notes>
 </file>
 
+<file path=ppt/notesSlides/notesSlide62.xml><?xml version="1.0" encoding="utf-8"?>
+<p:notes xmlns:a="http://schemas.openxmlformats.org/drawingml/2006/main" xmlns:r="http://schemas.openxmlformats.org/officeDocument/2006/relationships" xmlns:p="http://schemas.openxmlformats.org/presentationml/2006/main">
+  <p:cSld>
+    <p:spTree>
+      <p:nvGrpSpPr>
+        <p:cNvPr id="1" name=""/>
+        <p:cNvGrpSpPr/>
+        <p:nvPr/>
+      </p:nvGrpSpPr>
+      <p:grpSpPr>
+        <a:xfrm>
+          <a:off x="0" y="0"/>
+          <a:ext cx="0" cy="0"/>
+          <a:chOff x="0" y="0"/>
+          <a:chExt cx="0" cy="0"/>
+        </a:xfrm>
+      </p:grpSpPr>
+      <p:sp>
+        <p:nvSpPr>
+          <p:cNvPr id="2" name="Slide Image Placeholder 1"/>
+          <p:cNvSpPr>
+            <a:spLocks noGrp="1" noRot="1" noChangeAspect="1"/>
+          </p:cNvSpPr>
+          <p:nvPr>
+            <p:ph type="sldImg"/>
+          </p:nvPr>
+        </p:nvSpPr>
+        <p:spPr/>
+      </p:sp>
+      <p:sp>
+        <p:nvSpPr>
+          <p:cNvPr id="3" name="Notes Placeholder 2"/>
+          <p:cNvSpPr>
+            <a:spLocks noGrp="1"/>
+          </p:cNvSpPr>
+          <p:nvPr>
+            <p:ph type="body" idx="1"/>
+          </p:nvPr>
+        </p:nvSpPr>
+        <p:spPr/>
+        <p:txBody>
+          <a:bodyPr/>
+          <a:lstStyle/>
+          <a:p>
+            <a:endParaRPr lang="pt-BR" dirty="0"/>
+          </a:p>
+        </p:txBody>
+      </p:sp>
+      <p:sp>
+        <p:nvSpPr>
+          <p:cNvPr id="4" name="Slide Number Placeholder 3"/>
+          <p:cNvSpPr>
+            <a:spLocks noGrp="1"/>
+          </p:cNvSpPr>
+          <p:nvPr>
+            <p:ph type="sldNum" sz="quarter" idx="5"/>
+          </p:nvPr>
+        </p:nvSpPr>
+        <p:spPr/>
+        <p:txBody>
+          <a:bodyPr/>
+          <a:lstStyle/>
+          <a:p>
+            <a:fld id="{020F486D-935E-4125-8FD7-C735663CC7DE}" type="slidenum">
+              <a:rPr lang="pt-BR" smtClean="0"/>
+              <a:t>62</a:t>
+            </a:fld>
+            <a:endParaRPr lang="pt-BR"/>
+          </a:p>
+        </p:txBody>
+      </p:sp>
+    </p:spTree>
+    <p:extLst>
+      <p:ext uri="{BB962C8B-B14F-4D97-AF65-F5344CB8AC3E}">
+        <p14:creationId xmlns:p14="http://schemas.microsoft.com/office/powerpoint/2010/main" val="1008064520"/>
+      </p:ext>
+    </p:extLst>
+  </p:cSld>
+  <p:clrMapOvr>
+    <a:masterClrMapping/>
+  </p:clrMapOvr>
+</p:notes>
+</file>
+
 <file path=ppt/notesSlides/notesSlide7.xml><?xml version="1.0" encoding="utf-8"?>
 <p:notes xmlns:a="http://schemas.openxmlformats.org/drawingml/2006/main" xmlns:r="http://schemas.openxmlformats.org/officeDocument/2006/relationships" xmlns:p="http://schemas.openxmlformats.org/presentationml/2006/main">
   <p:cSld>
@@ -6319,7 +6404,7 @@
           <a:p>
             <a:fld id="{9642BF85-54FF-46CE-B398-87F998CFD60B}" type="datetimeFigureOut">
               <a:rPr lang="pt-BR" smtClean="0"/>
-              <a:t>17/10/2018</a:t>
+              <a:t>12/11/2019</a:t>
             </a:fld>
             <a:endParaRPr lang="pt-BR"/>
           </a:p>
@@ -6487,7 +6572,7 @@
           <a:p>
             <a:fld id="{9642BF85-54FF-46CE-B398-87F998CFD60B}" type="datetimeFigureOut">
               <a:rPr lang="pt-BR" smtClean="0"/>
-              <a:t>17/10/2018</a:t>
+              <a:t>12/11/2019</a:t>
             </a:fld>
             <a:endParaRPr lang="pt-BR"/>
           </a:p>
@@ -6665,7 +6750,7 @@
           <a:p>
             <a:fld id="{9642BF85-54FF-46CE-B398-87F998CFD60B}" type="datetimeFigureOut">
               <a:rPr lang="pt-BR" smtClean="0"/>
-              <a:t>17/10/2018</a:t>
+              <a:t>12/11/2019</a:t>
             </a:fld>
             <a:endParaRPr lang="pt-BR"/>
           </a:p>
@@ -7002,7 +7087,7 @@
           <a:p>
             <a:fld id="{9642BF85-54FF-46CE-B398-87F998CFD60B}" type="datetimeFigureOut">
               <a:rPr lang="pt-BR" smtClean="0"/>
-              <a:t>17/10/2018</a:t>
+              <a:t>12/11/2019</a:t>
             </a:fld>
             <a:endParaRPr lang="pt-BR"/>
           </a:p>
@@ -7273,7 +7358,7 @@
           <a:p>
             <a:fld id="{9642BF85-54FF-46CE-B398-87F998CFD60B}" type="datetimeFigureOut">
               <a:rPr lang="pt-BR" smtClean="0"/>
-              <a:t>17/10/2018</a:t>
+              <a:t>12/11/2019</a:t>
             </a:fld>
             <a:endParaRPr lang="pt-BR"/>
           </a:p>
@@ -7519,7 +7604,7 @@
           <a:p>
             <a:fld id="{9642BF85-54FF-46CE-B398-87F998CFD60B}" type="datetimeFigureOut">
               <a:rPr lang="pt-BR" smtClean="0"/>
-              <a:t>17/10/2018</a:t>
+              <a:t>12/11/2019</a:t>
             </a:fld>
             <a:endParaRPr lang="pt-BR"/>
           </a:p>
@@ -7883,7 +7968,7 @@
           <a:p>
             <a:fld id="{9642BF85-54FF-46CE-B398-87F998CFD60B}" type="datetimeFigureOut">
               <a:rPr lang="pt-BR" smtClean="0"/>
-              <a:t>17/10/2018</a:t>
+              <a:t>12/11/2019</a:t>
             </a:fld>
             <a:endParaRPr lang="pt-BR"/>
           </a:p>
@@ -8017,7 +8102,7 @@
           <a:p>
             <a:fld id="{9642BF85-54FF-46CE-B398-87F998CFD60B}" type="datetimeFigureOut">
               <a:rPr lang="pt-BR" smtClean="0"/>
-              <a:t>17/10/2018</a:t>
+              <a:t>12/11/2019</a:t>
             </a:fld>
             <a:endParaRPr lang="pt-BR"/>
           </a:p>
@@ -8112,7 +8197,7 @@
           <a:p>
             <a:fld id="{9642BF85-54FF-46CE-B398-87F998CFD60B}" type="datetimeFigureOut">
               <a:rPr lang="pt-BR" smtClean="0"/>
-              <a:t>17/10/2018</a:t>
+              <a:t>12/11/2019</a:t>
             </a:fld>
             <a:endParaRPr lang="pt-BR"/>
           </a:p>
@@ -8387,7 +8472,7 @@
           <a:p>
             <a:fld id="{9642BF85-54FF-46CE-B398-87F998CFD60B}" type="datetimeFigureOut">
               <a:rPr lang="pt-BR" smtClean="0"/>
-              <a:t>17/10/2018</a:t>
+              <a:t>12/11/2019</a:t>
             </a:fld>
             <a:endParaRPr lang="pt-BR"/>
           </a:p>
@@ -8639,7 +8724,7 @@
           <a:p>
             <a:fld id="{9642BF85-54FF-46CE-B398-87F998CFD60B}" type="datetimeFigureOut">
               <a:rPr lang="pt-BR" smtClean="0"/>
-              <a:t>17/10/2018</a:t>
+              <a:t>12/11/2019</a:t>
             </a:fld>
             <a:endParaRPr lang="pt-BR"/>
           </a:p>
@@ -8859,7 +8944,7 @@
           <a:p>
             <a:fld id="{9642BF85-54FF-46CE-B398-87F998CFD60B}" type="datetimeFigureOut">
               <a:rPr lang="pt-BR" smtClean="0"/>
-              <a:t>17/10/2018</a:t>
+              <a:t>12/11/2019</a:t>
             </a:fld>
             <a:endParaRPr lang="pt-BR"/>
           </a:p>
@@ -14237,7 +14322,7 @@
           <a:p>
             <a:r>
               <a:rPr lang="pt-BR" dirty="0"/>
-              <a:t>Antes realizar alterações baseadas em especulações sem fundamentos, é importante realizarmos uma análise detalhada da performance do jogo.</a:t>
+              <a:t>Antes de realizar alterações baseadas em especulações sem fundamentos, é importante realizarmos uma análise detalhada da performance do jogo.</a:t>
             </a:r>
           </a:p>
           <a:p>
@@ -15571,7 +15656,7 @@
             </a:r>
             <a:r>
               <a:rPr lang="pt-BR" dirty="0"/>
-              <a:t> estiver disponível para o dispositivo alvo, basta observar se o tempo gasto pela GPU e pela CPU em um conjunto de </a:t>
+              <a:t> estiver disponível para o dispositivo alvo, basta observar o tempo gasto pela GPU e pela CPU em um conjunto de </a:t>
             </a:r>
             <a:r>
               <a:rPr lang="pt-BR" i="1" dirty="0"/>
@@ -17110,6 +17195,92 @@
     <p:extLst>
       <p:ext uri="{BB962C8B-B14F-4D97-AF65-F5344CB8AC3E}">
         <p14:creationId xmlns:p14="http://schemas.microsoft.com/office/powerpoint/2010/main" val="3708538185"/>
+      </p:ext>
+    </p:extLst>
+  </p:cSld>
+  <p:clrMapOvr>
+    <a:masterClrMapping/>
+  </p:clrMapOvr>
+</p:sld>
+</file>
+
+<file path=ppt/slides/slide62.xml><?xml version="1.0" encoding="utf-8"?>
+<p:sld xmlns:a="http://schemas.openxmlformats.org/drawingml/2006/main" xmlns:r="http://schemas.openxmlformats.org/officeDocument/2006/relationships" xmlns:p="http://schemas.openxmlformats.org/presentationml/2006/main">
+  <p:cSld>
+    <p:spTree>
+      <p:nvGrpSpPr>
+        <p:cNvPr id="1" name=""/>
+        <p:cNvGrpSpPr/>
+        <p:nvPr/>
+      </p:nvGrpSpPr>
+      <p:grpSpPr>
+        <a:xfrm>
+          <a:off x="0" y="0"/>
+          <a:ext cx="0" cy="0"/>
+          <a:chOff x="0" y="0"/>
+          <a:chExt cx="0" cy="0"/>
+        </a:xfrm>
+      </p:grpSpPr>
+      <p:sp>
+        <p:nvSpPr>
+          <p:cNvPr id="5" name="Título 4"/>
+          <p:cNvSpPr>
+            <a:spLocks noGrp="1"/>
+          </p:cNvSpPr>
+          <p:nvPr>
+            <p:ph type="title"/>
+          </p:nvPr>
+        </p:nvSpPr>
+        <p:spPr/>
+        <p:txBody>
+          <a:bodyPr>
+            <a:normAutofit/>
+          </a:bodyPr>
+          <a:lstStyle/>
+          <a:p>
+            <a:r>
+              <a:rPr lang="pt-BR" dirty="0"/>
+              <a:t>Referências</a:t>
+            </a:r>
+          </a:p>
+        </p:txBody>
+      </p:sp>
+      <p:sp>
+        <p:nvSpPr>
+          <p:cNvPr id="6" name="Espaço Reservado para Conteúdo 5"/>
+          <p:cNvSpPr>
+            <a:spLocks noGrp="1"/>
+          </p:cNvSpPr>
+          <p:nvPr>
+            <p:ph idx="1"/>
+          </p:nvPr>
+        </p:nvSpPr>
+        <p:spPr>
+          <a:xfrm>
+            <a:off x="317694" y="1291052"/>
+            <a:ext cx="11705493" cy="5011777"/>
+          </a:xfrm>
+        </p:spPr>
+        <p:txBody>
+          <a:bodyPr>
+            <a:normAutofit/>
+          </a:bodyPr>
+          <a:lstStyle/>
+          <a:p>
+            <a:r>
+              <a:rPr lang="en-US" dirty="0">
+                <a:hlinkClick r:id="rId3"/>
+              </a:rPr>
+              <a:t>https://learn.unity.com/course/performance-and-optimisation</a:t>
+            </a:r>
+            <a:endParaRPr lang="pt-BR" dirty="0"/>
+          </a:p>
+        </p:txBody>
+      </p:sp>
+    </p:spTree>
+    <p:extLst>
+      <p:ext uri="{BB962C8B-B14F-4D97-AF65-F5344CB8AC3E}">
+        <p14:creationId xmlns:p14="http://schemas.microsoft.com/office/powerpoint/2010/main" val="2436293185"/>
       </p:ext>
     </p:extLst>
   </p:cSld>

</xml_diff>